<commit_message>
new slides + fix on backend
</commit_message>
<xml_diff>
--- a/slides.pptx
+++ b/slides.pptx
@@ -247,7 +247,7 @@
           <a:p>
             <a:fld id="{25A0F723-D203-40DC-991B-A58E274D6627}" type="datetimeFigureOut">
               <a:rPr lang="it-IT" smtClean="0"/>
-              <a:t>22/06/2018</a:t>
+              <a:t>16/10/2018</a:t>
             </a:fld>
             <a:endParaRPr lang="it-IT"/>
           </a:p>
@@ -628,7 +628,7 @@
           <a:p>
             <a:fld id="{A57064AC-3FCB-4614-8842-A1085921C17E}" type="datetimeFigureOut">
               <a:rPr lang="it-IT" smtClean="0"/>
-              <a:t>22/06/2018</a:t>
+              <a:t>16/10/2018</a:t>
             </a:fld>
             <a:endParaRPr lang="it-IT"/>
           </a:p>
@@ -995,7 +995,7 @@
           <a:p>
             <a:fld id="{A57064AC-3FCB-4614-8842-A1085921C17E}" type="datetimeFigureOut">
               <a:rPr lang="it-IT" smtClean="0"/>
-              <a:t>22/06/2018</a:t>
+              <a:t>16/10/2018</a:t>
             </a:fld>
             <a:endParaRPr lang="it-IT"/>
           </a:p>
@@ -1177,7 +1177,7 @@
           <a:p>
             <a:fld id="{A57064AC-3FCB-4614-8842-A1085921C17E}" type="datetimeFigureOut">
               <a:rPr lang="it-IT" smtClean="0"/>
-              <a:t>22/06/2018</a:t>
+              <a:t>16/10/2018</a:t>
             </a:fld>
             <a:endParaRPr lang="it-IT"/>
           </a:p>
@@ -1369,7 +1369,7 @@
           <a:p>
             <a:fld id="{A57064AC-3FCB-4614-8842-A1085921C17E}" type="datetimeFigureOut">
               <a:rPr lang="it-IT" smtClean="0"/>
-              <a:t>22/06/2018</a:t>
+              <a:t>16/10/2018</a:t>
             </a:fld>
             <a:endParaRPr lang="it-IT"/>
           </a:p>
@@ -1682,7 +1682,7 @@
           <a:p>
             <a:fld id="{A57064AC-3FCB-4614-8842-A1085921C17E}" type="datetimeFigureOut">
               <a:rPr lang="it-IT" smtClean="0"/>
-              <a:t>22/06/2018</a:t>
+              <a:t>16/10/2018</a:t>
             </a:fld>
             <a:endParaRPr lang="it-IT"/>
           </a:p>
@@ -1962,7 +1962,7 @@
           <a:p>
             <a:fld id="{A57064AC-3FCB-4614-8842-A1085921C17E}" type="datetimeFigureOut">
               <a:rPr lang="it-IT" smtClean="0"/>
-              <a:t>22/06/2018</a:t>
+              <a:t>16/10/2018</a:t>
             </a:fld>
             <a:endParaRPr lang="it-IT"/>
           </a:p>
@@ -2323,7 +2323,7 @@
           <a:p>
             <a:fld id="{A57064AC-3FCB-4614-8842-A1085921C17E}" type="datetimeFigureOut">
               <a:rPr lang="it-IT" smtClean="0"/>
-              <a:t>22/06/2018</a:t>
+              <a:t>16/10/2018</a:t>
             </a:fld>
             <a:endParaRPr lang="it-IT"/>
           </a:p>
@@ -2772,7 +2772,7 @@
           <a:p>
             <a:fld id="{A57064AC-3FCB-4614-8842-A1085921C17E}" type="datetimeFigureOut">
               <a:rPr lang="it-IT" smtClean="0"/>
-              <a:t>22/06/2018</a:t>
+              <a:t>16/10/2018</a:t>
             </a:fld>
             <a:endParaRPr lang="it-IT"/>
           </a:p>
@@ -2902,7 +2902,7 @@
           <a:p>
             <a:fld id="{A57064AC-3FCB-4614-8842-A1085921C17E}" type="datetimeFigureOut">
               <a:rPr lang="it-IT" smtClean="0"/>
-              <a:t>22/06/2018</a:t>
+              <a:t>16/10/2018</a:t>
             </a:fld>
             <a:endParaRPr lang="it-IT"/>
           </a:p>
@@ -3017,7 +3017,7 @@
           <a:p>
             <a:fld id="{A57064AC-3FCB-4614-8842-A1085921C17E}" type="datetimeFigureOut">
               <a:rPr lang="it-IT" smtClean="0"/>
-              <a:t>22/06/2018</a:t>
+              <a:t>16/10/2018</a:t>
             </a:fld>
             <a:endParaRPr lang="it-IT"/>
           </a:p>
@@ -3331,7 +3331,7 @@
           <a:p>
             <a:fld id="{A57064AC-3FCB-4614-8842-A1085921C17E}" type="datetimeFigureOut">
               <a:rPr lang="it-IT" smtClean="0"/>
-              <a:t>22/06/2018</a:t>
+              <a:t>16/10/2018</a:t>
             </a:fld>
             <a:endParaRPr lang="it-IT"/>
           </a:p>
@@ -3719,7 +3719,7 @@
           <a:p>
             <a:fld id="{A57064AC-3FCB-4614-8842-A1085921C17E}" type="datetimeFigureOut">
               <a:rPr lang="it-IT" smtClean="0"/>
-              <a:t>22/06/2018</a:t>
+              <a:t>16/10/2018</a:t>
             </a:fld>
             <a:endParaRPr lang="it-IT"/>
           </a:p>
@@ -4066,7 +4066,7 @@
           <a:p>
             <a:fld id="{A57064AC-3FCB-4614-8842-A1085921C17E}" type="datetimeFigureOut">
               <a:rPr lang="it-IT" smtClean="0"/>
-              <a:t>22/06/2018</a:t>
+              <a:t>16/10/2018</a:t>
             </a:fld>
             <a:endParaRPr lang="it-IT"/>
           </a:p>
@@ -4625,7 +4625,21 @@
             </a:br>
             <a:r>
               <a:rPr lang="en-GB" sz="4000" dirty="0"/>
-              <a:t>From Zero to Azure in 60 minutes</a:t>
+              <a:t>From Zero to Azure </a:t>
+            </a:r>
+            <a:r>
+              <a:rPr lang="en-GB" sz="4000"/>
+              <a:t>in 60 (+ </a:t>
+            </a:r>
+            <a:r>
+              <a:rPr lang="en-GB" sz="4000">
+                <a:sym typeface="Wingdings" panose="05000000000000000000" pitchFamily="2" charset="2"/>
+              </a:rPr>
+              <a:t></a:t>
+            </a:r>
+            <a:r>
+              <a:rPr lang="en-GB" sz="4000"/>
+              <a:t>) minutes</a:t>
             </a:r>
             <a:endParaRPr lang="en-GB" dirty="0"/>
           </a:p>

</xml_diff>